<commit_message>
Updated progress report presentation after the  meeting.
</commit_message>
<xml_diff>
--- a/doc/Presentations/Progress Report.pptx
+++ b/doc/Presentations/Progress Report.pptx
@@ -7,12 +7,14 @@
   <p:sldIdLst>
     <p:sldId id="256" r:id="rId2"/>
     <p:sldId id="257" r:id="rId3"/>
-    <p:sldId id="258" r:id="rId4"/>
-    <p:sldId id="259" r:id="rId5"/>
-    <p:sldId id="260" r:id="rId6"/>
-    <p:sldId id="261" r:id="rId7"/>
-    <p:sldId id="262" r:id="rId8"/>
-    <p:sldId id="263" r:id="rId9"/>
+    <p:sldId id="264" r:id="rId4"/>
+    <p:sldId id="258" r:id="rId5"/>
+    <p:sldId id="265" r:id="rId6"/>
+    <p:sldId id="259" r:id="rId7"/>
+    <p:sldId id="260" r:id="rId8"/>
+    <p:sldId id="261" r:id="rId9"/>
+    <p:sldId id="262" r:id="rId10"/>
+    <p:sldId id="263" r:id="rId11"/>
   </p:sldIdLst>
   <p:sldSz cx="9144000" cy="6858000" type="screen4x3"/>
   <p:notesSz cx="6858000" cy="9144000"/>
@@ -394,7 +396,8 @@
           <a:p>
             <a:fld id="{C8E98999-376F-4247-A12C-8CA700A92BA6}" type="datetimeFigureOut">
               <a:rPr lang="en-US" smtClean="0"/>
-              <a:t>10/2/2012</a:t>
+              <a:pPr/>
+              <a:t>10/4/2012</a:t>
             </a:fld>
             <a:endParaRPr lang="en-US"/>
           </a:p>
@@ -623,6 +626,7 @@
           <a:p>
             <a:fld id="{8875AFED-C81F-4FDA-8F1F-4870653BE9A0}" type="slidenum">
               <a:rPr lang="en-US" smtClean="0"/>
+              <a:pPr/>
               <a:t>‹#›</a:t>
             </a:fld>
             <a:endParaRPr lang="en-US"/>
@@ -787,7 +791,8 @@
           <a:p>
             <a:fld id="{C8E98999-376F-4247-A12C-8CA700A92BA6}" type="datetimeFigureOut">
               <a:rPr lang="en-US" smtClean="0"/>
-              <a:t>10/2/2012</a:t>
+              <a:pPr/>
+              <a:t>10/4/2012</a:t>
             </a:fld>
             <a:endParaRPr lang="en-US"/>
           </a:p>
@@ -829,6 +834,7 @@
           <a:p>
             <a:fld id="{8875AFED-C81F-4FDA-8F1F-4870653BE9A0}" type="slidenum">
               <a:rPr lang="en-US" smtClean="0"/>
+              <a:pPr/>
               <a:t>‹#›</a:t>
             </a:fld>
             <a:endParaRPr lang="en-US"/>
@@ -1239,6 +1245,7 @@
           <a:p>
             <a:fld id="{8875AFED-C81F-4FDA-8F1F-4870653BE9A0}" type="slidenum">
               <a:rPr lang="en-US" smtClean="0"/>
+              <a:pPr/>
               <a:t>‹#›</a:t>
             </a:fld>
             <a:endParaRPr lang="en-US"/>
@@ -1319,7 +1326,8 @@
           <a:p>
             <a:fld id="{C8E98999-376F-4247-A12C-8CA700A92BA6}" type="datetimeFigureOut">
               <a:rPr lang="en-US" smtClean="0"/>
-              <a:t>10/2/2012</a:t>
+              <a:pPr/>
+              <a:t>10/4/2012</a:t>
             </a:fld>
             <a:endParaRPr lang="en-US"/>
           </a:p>
@@ -1452,7 +1460,8 @@
           <a:p>
             <a:fld id="{C8E98999-376F-4247-A12C-8CA700A92BA6}" type="datetimeFigureOut">
               <a:rPr lang="en-US" smtClean="0"/>
-              <a:t>10/2/2012</a:t>
+              <a:pPr/>
+              <a:t>10/4/2012</a:t>
             </a:fld>
             <a:endParaRPr lang="en-US"/>
           </a:p>
@@ -1499,6 +1508,7 @@
           <a:p>
             <a:fld id="{8875AFED-C81F-4FDA-8F1F-4870653BE9A0}" type="slidenum">
               <a:rPr lang="en-US" smtClean="0"/>
+              <a:pPr/>
               <a:t>‹#›</a:t>
             </a:fld>
             <a:endParaRPr lang="en-US"/>
@@ -1995,7 +2005,8 @@
           <a:p>
             <a:fld id="{C8E98999-376F-4247-A12C-8CA700A92BA6}" type="datetimeFigureOut">
               <a:rPr lang="en-US" smtClean="0"/>
-              <a:t>10/2/2012</a:t>
+              <a:pPr/>
+              <a:t>10/4/2012</a:t>
             </a:fld>
             <a:endParaRPr lang="en-US"/>
           </a:p>
@@ -2167,6 +2178,7 @@
           <a:p>
             <a:fld id="{8875AFED-C81F-4FDA-8F1F-4870653BE9A0}" type="slidenum">
               <a:rPr lang="en-US" smtClean="0"/>
+              <a:pPr/>
               <a:t>‹#›</a:t>
             </a:fld>
             <a:endParaRPr lang="en-US"/>
@@ -2290,7 +2302,8 @@
           <a:p>
             <a:fld id="{C8E98999-376F-4247-A12C-8CA700A92BA6}" type="datetimeFigureOut">
               <a:rPr lang="en-US" smtClean="0"/>
-              <a:t>10/2/2012</a:t>
+              <a:pPr/>
+              <a:t>10/4/2012</a:t>
             </a:fld>
             <a:endParaRPr lang="en-US"/>
           </a:p>
@@ -2332,6 +2345,7 @@
           <a:p>
             <a:fld id="{8875AFED-C81F-4FDA-8F1F-4870653BE9A0}" type="slidenum">
               <a:rPr lang="en-US" smtClean="0"/>
+              <a:pPr/>
               <a:t>‹#›</a:t>
             </a:fld>
             <a:endParaRPr lang="en-US"/>
@@ -2949,7 +2963,8 @@
           <a:p>
             <a:fld id="{C8E98999-376F-4247-A12C-8CA700A92BA6}" type="datetimeFigureOut">
               <a:rPr lang="en-US" smtClean="0"/>
-              <a:t>10/2/2012</a:t>
+              <a:pPr/>
+              <a:t>10/4/2012</a:t>
             </a:fld>
             <a:endParaRPr lang="en-US"/>
           </a:p>
@@ -3291,6 +3306,7 @@
           <a:p>
             <a:fld id="{8875AFED-C81F-4FDA-8F1F-4870653BE9A0}" type="slidenum">
               <a:rPr lang="en-US" smtClean="0"/>
+              <a:pPr/>
               <a:t>‹#›</a:t>
             </a:fld>
             <a:endParaRPr lang="en-US"/>
@@ -3385,7 +3401,8 @@
           <a:p>
             <a:fld id="{C8E98999-376F-4247-A12C-8CA700A92BA6}" type="datetimeFigureOut">
               <a:rPr lang="en-US" smtClean="0"/>
-              <a:t>10/2/2012</a:t>
+              <a:pPr/>
+              <a:t>10/4/2012</a:t>
             </a:fld>
             <a:endParaRPr lang="en-US"/>
           </a:p>
@@ -3432,6 +3449,7 @@
           <a:p>
             <a:fld id="{8875AFED-C81F-4FDA-8F1F-4870653BE9A0}" type="slidenum">
               <a:rPr lang="en-US" smtClean="0"/>
+              <a:pPr/>
               <a:t>‹#›</a:t>
             </a:fld>
             <a:endParaRPr lang="en-US"/>
@@ -3698,7 +3716,8 @@
           <a:p>
             <a:fld id="{C8E98999-376F-4247-A12C-8CA700A92BA6}" type="datetimeFigureOut">
               <a:rPr lang="en-US" smtClean="0"/>
-              <a:t>10/2/2012</a:t>
+              <a:pPr/>
+              <a:t>10/4/2012</a:t>
             </a:fld>
             <a:endParaRPr lang="en-US"/>
           </a:p>
@@ -3753,6 +3772,7 @@
           <a:p>
             <a:fld id="{8875AFED-C81F-4FDA-8F1F-4870653BE9A0}" type="slidenum">
               <a:rPr lang="en-US" smtClean="0"/>
+              <a:pPr/>
               <a:t>‹#›</a:t>
             </a:fld>
             <a:endParaRPr lang="en-US"/>
@@ -4371,6 +4391,7 @@
           <a:p>
             <a:fld id="{8875AFED-C81F-4FDA-8F1F-4870653BE9A0}" type="slidenum">
               <a:rPr lang="en-US" smtClean="0"/>
+              <a:pPr/>
               <a:t>‹#›</a:t>
             </a:fld>
             <a:endParaRPr lang="en-US"/>
@@ -4430,7 +4451,8 @@
           <a:p>
             <a:fld id="{C8E98999-376F-4247-A12C-8CA700A92BA6}" type="datetimeFigureOut">
               <a:rPr lang="en-US" smtClean="0"/>
-              <a:t>10/2/2012</a:t>
+              <a:pPr/>
+              <a:t>10/4/2012</a:t>
             </a:fld>
             <a:endParaRPr lang="en-US"/>
           </a:p>
@@ -4905,6 +4927,7 @@
           <a:p>
             <a:fld id="{8875AFED-C81F-4FDA-8F1F-4870653BE9A0}" type="slidenum">
               <a:rPr lang="en-US" smtClean="0"/>
+              <a:pPr/>
               <a:t>‹#›</a:t>
             </a:fld>
             <a:endParaRPr lang="en-US"/>
@@ -5094,7 +5117,8 @@
           <a:p>
             <a:fld id="{C8E98999-376F-4247-A12C-8CA700A92BA6}" type="datetimeFigureOut">
               <a:rPr lang="en-US" smtClean="0"/>
-              <a:t>10/2/2012</a:t>
+              <a:pPr/>
+              <a:t>10/4/2012</a:t>
             </a:fld>
             <a:endParaRPr lang="en-US"/>
           </a:p>
@@ -5367,7 +5391,8 @@
           <a:p>
             <a:fld id="{C8E98999-376F-4247-A12C-8CA700A92BA6}" type="datetimeFigureOut">
               <a:rPr lang="en-US" smtClean="0"/>
-              <a:t>10/2/2012</a:t>
+              <a:pPr/>
+              <a:t>10/4/2012</a:t>
             </a:fld>
             <a:endParaRPr lang="en-US"/>
           </a:p>
@@ -5617,6 +5642,7 @@
           <a:p>
             <a:fld id="{8875AFED-C81F-4FDA-8F1F-4870653BE9A0}" type="slidenum">
               <a:rPr lang="en-US" smtClean="0"/>
+              <a:pPr/>
               <a:t>‹#›</a:t>
             </a:fld>
             <a:endParaRPr lang="en-US"/>
@@ -6057,15 +6083,12 @@
           <a:p>
             <a:r>
               <a:rPr lang="en-US" dirty="0" smtClean="0"/>
-              <a:t>Progress Report</a:t>
-            </a:r>
-          </a:p>
-          <a:p>
-            <a:r>
-              <a:rPr lang="en-US" dirty="0" smtClean="0"/>
-              <a:t>Zorayr Khalapyan</a:t>
-            </a:r>
-            <a:endParaRPr lang="en-US" dirty="0"/>
+              <a:t>Progress </a:t>
+            </a:r>
+            <a:r>
+              <a:rPr lang="en-US" dirty="0" smtClean="0"/>
+              <a:t>Report</a:t>
+            </a:r>
           </a:p>
         </p:txBody>
       </p:sp>
@@ -6086,11 +6109,11 @@
           <a:p>
             <a:r>
               <a:rPr lang="en-US" dirty="0" err="1" smtClean="0"/>
-              <a:t>Ohmage</a:t>
-            </a:r>
-            <a:r>
-              <a:rPr lang="en-US" dirty="0" smtClean="0"/>
-              <a:t>/MWF</a:t>
+              <a:t>ohmage</a:t>
+            </a:r>
+            <a:r>
+              <a:rPr lang="en-US" dirty="0" smtClean="0"/>
+              <a:t>-MWF</a:t>
             </a:r>
             <a:endParaRPr lang="en-US" dirty="0"/>
           </a:p>
@@ -6101,6 +6124,154 @@
   <p:clrMapOvr>
     <a:masterClrMapping/>
   </p:clrMapOvr>
+  <p:timing>
+    <p:tnLst>
+      <p:par>
+        <p:cTn id="1" dur="indefinite" restart="never" nodeType="tmRoot"/>
+      </p:par>
+    </p:tnLst>
+  </p:timing>
+</p:sld>
+</file>
+
+<file path=ppt/slides/slide10.xml><?xml version="1.0" encoding="utf-8"?>
+<p:sld xmlns:a="http://schemas.openxmlformats.org/drawingml/2006/main" xmlns:r="http://schemas.openxmlformats.org/officeDocument/2006/relationships" xmlns:p="http://schemas.openxmlformats.org/presentationml/2006/main">
+  <p:cSld>
+    <p:spTree>
+      <p:nvGrpSpPr>
+        <p:cNvPr id="1" name=""/>
+        <p:cNvGrpSpPr/>
+        <p:nvPr/>
+      </p:nvGrpSpPr>
+      <p:grpSpPr>
+        <a:xfrm>
+          <a:off x="0" y="0"/>
+          <a:ext cx="0" cy="0"/>
+          <a:chOff x="0" y="0"/>
+          <a:chExt cx="0" cy="0"/>
+        </a:xfrm>
+      </p:grpSpPr>
+      <p:sp>
+        <p:nvSpPr>
+          <p:cNvPr id="2" name="Title 1"/>
+          <p:cNvSpPr>
+            <a:spLocks noGrp="1"/>
+          </p:cNvSpPr>
+          <p:nvPr>
+            <p:ph type="title"/>
+          </p:nvPr>
+        </p:nvSpPr>
+        <p:spPr/>
+        <p:txBody>
+          <a:bodyPr/>
+          <a:lstStyle/>
+          <a:p>
+            <a:r>
+              <a:rPr lang="en-US" dirty="0" smtClean="0"/>
+              <a:t>What to do next?</a:t>
+            </a:r>
+            <a:endParaRPr lang="en-US" dirty="0"/>
+          </a:p>
+        </p:txBody>
+      </p:sp>
+      <p:sp>
+        <p:nvSpPr>
+          <p:cNvPr id="3" name="Content Placeholder 2"/>
+          <p:cNvSpPr>
+            <a:spLocks noGrp="1"/>
+          </p:cNvSpPr>
+          <p:nvPr>
+            <p:ph sz="quarter" idx="1"/>
+          </p:nvPr>
+        </p:nvSpPr>
+        <p:spPr/>
+        <p:txBody>
+          <a:bodyPr/>
+          <a:lstStyle/>
+          <a:p>
+            <a:r>
+              <a:rPr lang="en-US" dirty="0" smtClean="0"/>
+              <a:t>Prioritize and </a:t>
+            </a:r>
+            <a:r>
+              <a:rPr lang="en-US" dirty="0" smtClean="0"/>
+              <a:t>schedule </a:t>
+            </a:r>
+            <a:r>
+              <a:rPr lang="en-US" dirty="0" smtClean="0">
+                <a:sym typeface="Wingdings" pitchFamily="2" charset="2"/>
+              </a:rPr>
+              <a:t> milestones</a:t>
+            </a:r>
+            <a:endParaRPr lang="en-US" dirty="0" smtClean="0"/>
+          </a:p>
+          <a:p>
+            <a:r>
+              <a:rPr lang="en-US" dirty="0" smtClean="0"/>
+              <a:t>Work on device-specific </a:t>
+            </a:r>
+            <a:r>
+              <a:rPr lang="en-US" dirty="0" smtClean="0"/>
+              <a:t>bugs</a:t>
+            </a:r>
+          </a:p>
+          <a:p>
+            <a:r>
+              <a:rPr lang="en-US" dirty="0" smtClean="0"/>
+              <a:t>Refractor and optimize </a:t>
+            </a:r>
+            <a:endParaRPr lang="en-US" dirty="0" smtClean="0"/>
+          </a:p>
+          <a:p>
+            <a:r>
+              <a:rPr lang="en-US" dirty="0" smtClean="0"/>
+              <a:t>Moving towards </a:t>
+            </a:r>
+            <a:r>
+              <a:rPr lang="en-US" dirty="0" err="1" smtClean="0"/>
+              <a:t>WebBlocks</a:t>
+            </a:r>
+            <a:r>
+              <a:rPr lang="en-US" dirty="0" smtClean="0"/>
+              <a:t> or upgrade the WMF version? </a:t>
+            </a:r>
+          </a:p>
+          <a:p>
+            <a:r>
+              <a:rPr lang="en-US" dirty="0" smtClean="0"/>
+              <a:t>A better website?</a:t>
+            </a:r>
+          </a:p>
+          <a:p>
+            <a:r>
+              <a:rPr lang="en-US" dirty="0" smtClean="0"/>
+              <a:t>Test</a:t>
+            </a:r>
+            <a:endParaRPr lang="en-US" dirty="0" smtClean="0"/>
+          </a:p>
+          <a:p>
+            <a:r>
+              <a:rPr lang="en-US" dirty="0" smtClean="0"/>
+              <a:t>Progress tracking &amp; bi-weekly meetings</a:t>
+            </a:r>
+          </a:p>
+          <a:p>
+            <a:endParaRPr lang="en-US" dirty="0" smtClean="0"/>
+          </a:p>
+        </p:txBody>
+      </p:sp>
+    </p:spTree>
+  </p:cSld>
+  <p:clrMapOvr>
+    <a:masterClrMapping/>
+  </p:clrMapOvr>
+  <p:timing>
+    <p:tnLst>
+      <p:par>
+        <p:cTn id="1" dur="indefinite" restart="never" nodeType="tmRoot"/>
+      </p:par>
+    </p:tnLst>
+  </p:timing>
 </p:sld>
 </file>
 
@@ -6160,8 +6331,27 @@
           <a:lstStyle/>
           <a:p>
             <a:r>
-              <a:rPr lang="en-US" dirty="0" smtClean="0"/>
-              <a:t>Current outstanding issues</a:t>
+              <a:rPr lang="en-US" dirty="0" err="1" smtClean="0"/>
+              <a:t>MobileHCI</a:t>
+            </a:r>
+            <a:r>
+              <a:rPr lang="en-US" dirty="0" smtClean="0"/>
+              <a:t> </a:t>
+            </a:r>
+            <a:r>
+              <a:rPr lang="en-US" dirty="0" smtClean="0"/>
+              <a:t>2012</a:t>
+            </a:r>
+            <a:endParaRPr lang="en-US" dirty="0" smtClean="0"/>
+          </a:p>
+          <a:p>
+            <a:r>
+              <a:rPr lang="en-US" dirty="0" smtClean="0"/>
+              <a:t>Current </a:t>
+            </a:r>
+            <a:r>
+              <a:rPr lang="en-US" dirty="0" smtClean="0"/>
+              <a:t>outstanding issues</a:t>
             </a:r>
           </a:p>
           <a:p>
@@ -6173,7 +6363,11 @@
           <a:p>
             <a:r>
               <a:rPr lang="en-US" dirty="0" smtClean="0"/>
-              <a:t>Updates with WP7</a:t>
+              <a:t>Updates </a:t>
+            </a:r>
+            <a:r>
+              <a:rPr lang="en-US" dirty="0" smtClean="0"/>
+              <a:t>with WP7</a:t>
             </a:r>
           </a:p>
           <a:p>
@@ -6202,6 +6396,13 @@
   <p:clrMapOvr>
     <a:masterClrMapping/>
   </p:clrMapOvr>
+  <p:timing>
+    <p:tnLst>
+      <p:par>
+        <p:cTn id="1" dur="indefinite" restart="never" nodeType="tmRoot"/>
+      </p:par>
+    </p:tnLst>
+  </p:timing>
 </p:sld>
 </file>
 
@@ -6238,8 +6439,12 @@
           <a:lstStyle/>
           <a:p>
             <a:r>
-              <a:rPr lang="en-US" dirty="0" smtClean="0"/>
-              <a:t>Outstanding Issues</a:t>
+              <a:rPr lang="en-US" dirty="0" err="1" smtClean="0"/>
+              <a:t>MobileHCI</a:t>
+            </a:r>
+            <a:r>
+              <a:rPr lang="en-US" dirty="0" smtClean="0"/>
+              <a:t> 2012</a:t>
             </a:r>
             <a:endParaRPr lang="en-US" dirty="0"/>
           </a:p>
@@ -6257,90 +6462,44 @@
         </p:nvSpPr>
         <p:spPr/>
         <p:txBody>
-          <a:bodyPr>
-            <a:normAutofit/>
-          </a:bodyPr>
-          <a:lstStyle/>
-          <a:p>
-            <a:r>
-              <a:rPr lang="en-US" dirty="0" smtClean="0"/>
-              <a:t>About 23 issues on </a:t>
-            </a:r>
-            <a:r>
-              <a:rPr lang="en-US" dirty="0" err="1" smtClean="0"/>
-              <a:t>git</a:t>
-            </a:r>
-            <a:r>
-              <a:rPr lang="en-US" dirty="0" smtClean="0"/>
-              <a:t>.</a:t>
-            </a:r>
-          </a:p>
-          <a:p>
-            <a:r>
-              <a:rPr lang="en-US" dirty="0" smtClean="0"/>
-              <a:t>Visual</a:t>
+          <a:bodyPr/>
+          <a:lstStyle/>
+          <a:p>
+            <a:r>
+              <a:rPr lang="en-US" dirty="0" smtClean="0"/>
+              <a:t>Presentation by Rose</a:t>
+            </a:r>
+          </a:p>
+          <a:p>
+            <a:r>
+              <a:rPr lang="en-US" dirty="0" smtClean="0"/>
+              <a:t>Scot Jensen – keynote speaker at the conference.</a:t>
             </a:r>
           </a:p>
           <a:p>
             <a:pPr lvl="1"/>
             <a:r>
               <a:rPr lang="en-US" dirty="0" smtClean="0"/>
-              <a:t>Home button</a:t>
-            </a:r>
-          </a:p>
-          <a:p>
-            <a:pPr lvl="1"/>
-            <a:r>
-              <a:rPr lang="en-US" dirty="0" smtClean="0"/>
-              <a:t>Buttons/menu items</a:t>
-            </a:r>
-          </a:p>
-          <a:p>
-            <a:pPr lvl="1"/>
-            <a:r>
-              <a:rPr lang="en-US" dirty="0" err="1" smtClean="0"/>
-              <a:t>Timedate</a:t>
-            </a:r>
-            <a:r>
-              <a:rPr lang="en-US" dirty="0" smtClean="0"/>
-              <a:t> selector</a:t>
-            </a:r>
-          </a:p>
-          <a:p>
-            <a:r>
-              <a:rPr lang="en-US" dirty="0" smtClean="0"/>
-              <a:t>Technical</a:t>
-            </a:r>
-          </a:p>
-          <a:p>
-            <a:pPr lvl="1"/>
-            <a:r>
-              <a:rPr lang="en-US" dirty="0" smtClean="0"/>
-              <a:t>Moving towards JS MVC</a:t>
-            </a:r>
-          </a:p>
-          <a:p>
-            <a:pPr lvl="1"/>
-            <a:r>
-              <a:rPr lang="en-US" dirty="0" smtClean="0"/>
-              <a:t>Build tools</a:t>
-            </a:r>
-          </a:p>
-          <a:p>
-            <a:pPr lvl="1"/>
-            <a:r>
-              <a:rPr lang="en-US" dirty="0" err="1" smtClean="0"/>
-              <a:t>Testingg</a:t>
-            </a:r>
-            <a:endParaRPr lang="en-US" dirty="0" smtClean="0"/>
-          </a:p>
-          <a:p>
-            <a:r>
-              <a:rPr lang="en-US" dirty="0" smtClean="0"/>
-              <a:t>Device specific bugs</a:t>
-            </a:r>
-          </a:p>
-          <a:p>
+              <a:t>Mobile Apps Must Die</a:t>
+            </a:r>
+          </a:p>
+          <a:p>
+            <a:r>
+              <a:rPr lang="en-US" dirty="0" smtClean="0"/>
+              <a:t>Facebook: Regret doing mobile because of weak performance. Now they are going to go with native apps. </a:t>
+            </a:r>
+          </a:p>
+          <a:p>
+            <a:r>
+              <a:rPr lang="en-US" dirty="0" smtClean="0"/>
+              <a:t>Rose, send the notes </a:t>
+            </a:r>
+            <a:r>
+              <a:rPr lang="en-US" dirty="0" smtClean="0">
+                <a:sym typeface="Wingdings" pitchFamily="2" charset="2"/>
+              </a:rPr>
+              <a:t></a:t>
+            </a:r>
             <a:endParaRPr lang="en-US" dirty="0"/>
           </a:p>
         </p:txBody>
@@ -6350,6 +6509,13 @@
   <p:clrMapOvr>
     <a:masterClrMapping/>
   </p:clrMapOvr>
+  <p:timing>
+    <p:tnLst>
+      <p:par>
+        <p:cTn id="1" dur="indefinite" restart="never" nodeType="tmRoot"/>
+      </p:par>
+    </p:tnLst>
+  </p:timing>
 </p:sld>
 </file>
 
@@ -6387,7 +6553,7 @@
           <a:p>
             <a:r>
               <a:rPr lang="en-US" dirty="0" smtClean="0"/>
-              <a:t>Deployment</a:t>
+              <a:t>Outstanding Issues</a:t>
             </a:r>
             <a:endParaRPr lang="en-US" dirty="0"/>
           </a:p>
@@ -6405,55 +6571,90 @@
         </p:nvSpPr>
         <p:spPr/>
         <p:txBody>
-          <a:bodyPr/>
-          <a:lstStyle/>
-          <a:p>
-            <a:r>
-              <a:rPr lang="en-US" dirty="0" smtClean="0"/>
-              <a:t>User acceptance testing</a:t>
-            </a:r>
-          </a:p>
-          <a:p>
-            <a:r>
-              <a:rPr lang="en-US" dirty="0" smtClean="0"/>
-              <a:t>Prod servers?</a:t>
-            </a:r>
-          </a:p>
-          <a:p>
-            <a:r>
-              <a:rPr lang="en-US" dirty="0" smtClean="0"/>
-              <a:t>Deploying on </a:t>
+          <a:bodyPr>
+            <a:normAutofit/>
+          </a:bodyPr>
+          <a:lstStyle/>
+          <a:p>
+            <a:r>
+              <a:rPr lang="en-US" dirty="0" smtClean="0"/>
+              <a:t>About 23 issues on </a:t>
             </a:r>
             <a:r>
               <a:rPr lang="en-US" dirty="0" err="1" smtClean="0"/>
-              <a:t>iOS</a:t>
+              <a:t>git</a:t>
+            </a:r>
+            <a:r>
+              <a:rPr lang="en-US" dirty="0" smtClean="0"/>
+              <a:t>.</a:t>
+            </a:r>
+          </a:p>
+          <a:p>
+            <a:r>
+              <a:rPr lang="en-US" dirty="0" smtClean="0"/>
+              <a:t>Visual</a:t>
+            </a:r>
+          </a:p>
+          <a:p>
+            <a:pPr lvl="1"/>
+            <a:r>
+              <a:rPr lang="en-US" dirty="0" smtClean="0"/>
+              <a:t>Home button</a:t>
+            </a:r>
+          </a:p>
+          <a:p>
+            <a:pPr lvl="1"/>
+            <a:r>
+              <a:rPr lang="en-US" dirty="0" smtClean="0"/>
+              <a:t>Buttons/menu items</a:t>
+            </a:r>
+          </a:p>
+          <a:p>
+            <a:pPr lvl="1"/>
+            <a:r>
+              <a:rPr lang="en-US" dirty="0" err="1" smtClean="0"/>
+              <a:t>Timedate</a:t>
+            </a:r>
+            <a:r>
+              <a:rPr lang="en-US" dirty="0" smtClean="0"/>
+              <a:t> selector</a:t>
+            </a:r>
+          </a:p>
+          <a:p>
+            <a:r>
+              <a:rPr lang="en-US" dirty="0" smtClean="0"/>
+              <a:t>Technical</a:t>
+            </a:r>
+          </a:p>
+          <a:p>
+            <a:pPr lvl="1"/>
+            <a:r>
+              <a:rPr lang="en-US" dirty="0" smtClean="0"/>
+              <a:t>Moving towards JS MVC</a:t>
+            </a:r>
+          </a:p>
+          <a:p>
+            <a:pPr lvl="1"/>
+            <a:r>
+              <a:rPr lang="en-US" dirty="0" smtClean="0"/>
+              <a:t>Build tools</a:t>
+            </a:r>
+          </a:p>
+          <a:p>
+            <a:pPr lvl="1"/>
+            <a:r>
+              <a:rPr lang="en-US" dirty="0" smtClean="0"/>
+              <a:t>Testing</a:t>
             </a:r>
             <a:endParaRPr lang="en-US" dirty="0" smtClean="0"/>
           </a:p>
           <a:p>
-            <a:pPr lvl="1"/>
-            <a:r>
-              <a:rPr lang="en-US" dirty="0" smtClean="0"/>
-              <a:t>Need a test account with simple campaigns</a:t>
-            </a:r>
-          </a:p>
-          <a:p>
-            <a:pPr lvl="1"/>
-            <a:r>
-              <a:rPr lang="en-US" dirty="0" smtClean="0"/>
-              <a:t>Takes about a week to get approved</a:t>
-            </a:r>
-          </a:p>
-          <a:p>
-            <a:r>
-              <a:rPr lang="en-US" dirty="0" smtClean="0"/>
-              <a:t>Deploying on Android</a:t>
-            </a:r>
-          </a:p>
-          <a:p>
-            <a:pPr>
-              <a:buNone/>
-            </a:pPr>
+            <a:r>
+              <a:rPr lang="en-US" dirty="0" smtClean="0"/>
+              <a:t>Device specific bugs</a:t>
+            </a:r>
+          </a:p>
+          <a:p>
             <a:endParaRPr lang="en-US" dirty="0"/>
           </a:p>
         </p:txBody>
@@ -6463,6 +6664,13 @@
   <p:clrMapOvr>
     <a:masterClrMapping/>
   </p:clrMapOvr>
+  <p:timing>
+    <p:tnLst>
+      <p:par>
+        <p:cTn id="1" dur="indefinite" restart="never" nodeType="tmRoot"/>
+      </p:par>
+    </p:tnLst>
+  </p:timing>
 </p:sld>
 </file>
 
@@ -6500,7 +6708,7 @@
           <a:p>
             <a:r>
               <a:rPr lang="en-US" dirty="0" smtClean="0"/>
-              <a:t>Updates on WP7</a:t>
+              <a:t>Activity Breaks</a:t>
             </a:r>
             <a:endParaRPr lang="en-US" dirty="0"/>
           </a:p>
@@ -6523,70 +6731,73 @@
           <a:p>
             <a:r>
               <a:rPr lang="en-US" dirty="0" smtClean="0"/>
-              <a:t>Two major issues with WP7 IE9 engine (so far)</a:t>
+              <a:t>The first pilot (campaign </a:t>
+            </a:r>
+            <a:r>
+              <a:rPr lang="en-US" dirty="0" err="1" smtClean="0"/>
+              <a:t>config</a:t>
+            </a:r>
+            <a:r>
+              <a:rPr lang="en-US" dirty="0" smtClean="0"/>
+              <a:t>) is ready to go.</a:t>
             </a:r>
           </a:p>
           <a:p>
             <a:pPr lvl="1"/>
             <a:r>
-              <a:rPr lang="en-US" dirty="0" smtClean="0"/>
-              <a:t>No support for native </a:t>
-            </a:r>
-            <a:r>
               <a:rPr lang="en-US" dirty="0" err="1" smtClean="0"/>
-              <a:t>window.JSON</a:t>
-            </a:r>
+              <a:t>UCLAHealth</a:t>
+            </a:r>
+            <a:r>
+              <a:rPr lang="en-US" dirty="0" smtClean="0"/>
+              <a:t> (originally </a:t>
+            </a:r>
+            <a:r>
+              <a:rPr lang="en-US" dirty="0" err="1" smtClean="0"/>
+              <a:t>InstantRecess</a:t>
+            </a:r>
+            <a:r>
+              <a:rPr lang="en-US" dirty="0" smtClean="0"/>
+              <a:t>) </a:t>
+            </a:r>
+          </a:p>
+          <a:p>
+            <a:r>
+              <a:rPr lang="en-US" dirty="0" smtClean="0"/>
+              <a:t>How would the data be visualized? </a:t>
+            </a:r>
+          </a:p>
+          <a:p>
+            <a:r>
+              <a:rPr lang="en-US" dirty="0" smtClean="0"/>
+              <a:t>There are about 400 departments with 80 char long cost centers – major issue. </a:t>
+            </a:r>
+          </a:p>
+          <a:p>
+            <a:pPr lvl="1"/>
+            <a:r>
+              <a:rPr lang="en-US" dirty="0" smtClean="0"/>
+              <a:t>Look at the data and find out a generic way for creating an </a:t>
+            </a:r>
+            <a:r>
+              <a:rPr lang="en-US" dirty="0" err="1" smtClean="0"/>
+              <a:t>autocomplete</a:t>
+            </a:r>
+            <a:r>
+              <a:rPr lang="en-US" dirty="0" smtClean="0"/>
+              <a:t> prompt type. </a:t>
+            </a:r>
+          </a:p>
+          <a:p>
+            <a:pPr lvl="1"/>
+            <a:r>
+              <a:rPr lang="en-US" dirty="0" smtClean="0"/>
+              <a:t>Or come up with a hierarchical way of selecting a department</a:t>
+            </a:r>
+          </a:p>
+          <a:p>
+            <a:pPr lvl="1"/>
             <a:endParaRPr lang="en-US" dirty="0" smtClean="0"/>
-          </a:p>
-          <a:p>
-            <a:pPr lvl="1"/>
-            <a:r>
-              <a:rPr lang="en-US" dirty="0" smtClean="0"/>
-              <a:t>No support for native </a:t>
-            </a:r>
-            <a:r>
-              <a:rPr lang="en-US" dirty="0" err="1" smtClean="0"/>
-              <a:t>window.console</a:t>
-            </a:r>
-            <a:endParaRPr lang="en-US" dirty="0" smtClean="0"/>
-          </a:p>
-          <a:p>
-            <a:r>
-              <a:rPr lang="en-US" dirty="0" smtClean="0"/>
-              <a:t>Use Douglas </a:t>
-            </a:r>
-            <a:r>
-              <a:rPr lang="en-US" dirty="0" err="1" smtClean="0"/>
-              <a:t>Crockford’s</a:t>
-            </a:r>
-            <a:r>
-              <a:rPr lang="en-US" dirty="0" smtClean="0"/>
-              <a:t> JSON </a:t>
-            </a:r>
-            <a:r>
-              <a:rPr lang="en-US" dirty="0" err="1" smtClean="0"/>
-              <a:t>plugin</a:t>
-            </a:r>
-            <a:endParaRPr lang="en-US" dirty="0" smtClean="0"/>
-          </a:p>
-          <a:p>
-            <a:r>
-              <a:rPr lang="en-US" dirty="0" err="1" smtClean="0"/>
-              <a:t>LocalNotificationPlugin</a:t>
-            </a:r>
-            <a:endParaRPr lang="en-US" dirty="0" smtClean="0"/>
-          </a:p>
-          <a:p>
-            <a:pPr lvl="1"/>
-            <a:r>
-              <a:rPr lang="en-US" dirty="0" smtClean="0"/>
-              <a:t>Taron will be working concurrently on writing the </a:t>
-            </a:r>
-            <a:r>
-              <a:rPr lang="en-US" dirty="0" err="1" smtClean="0"/>
-              <a:t>plugin</a:t>
-            </a:r>
-            <a:endParaRPr lang="en-US" dirty="0"/>
           </a:p>
         </p:txBody>
       </p:sp>
@@ -6632,7 +6843,7 @@
           <a:p>
             <a:r>
               <a:rPr lang="en-US" dirty="0" smtClean="0"/>
-              <a:t>Updates on BB</a:t>
+              <a:t>Deployment</a:t>
             </a:r>
             <a:endParaRPr lang="en-US" dirty="0"/>
           </a:p>
@@ -6655,62 +6866,99 @@
           <a:p>
             <a:r>
               <a:rPr lang="en-US" dirty="0" smtClean="0"/>
-              <a:t>What version to work on? </a:t>
-            </a:r>
-          </a:p>
-          <a:p>
-            <a:r>
-              <a:rPr lang="en-US" dirty="0" smtClean="0"/>
-              <a:t>Have a working </a:t>
+              <a:t>User acceptance testing</a:t>
+            </a:r>
+          </a:p>
+          <a:p>
+            <a:r>
+              <a:rPr lang="en-US" dirty="0" smtClean="0"/>
+              <a:t>Prod servers</a:t>
+            </a:r>
+            <a:r>
+              <a:rPr lang="en-US" dirty="0" smtClean="0"/>
+              <a:t>?</a:t>
+            </a:r>
+          </a:p>
+          <a:p>
+            <a:pPr lvl="1"/>
+            <a:r>
+              <a:rPr lang="en-US" dirty="0" smtClean="0"/>
+              <a:t>Let Steven set up a VM prod server </a:t>
+            </a:r>
+          </a:p>
+          <a:p>
+            <a:pPr lvl="1"/>
+            <a:r>
+              <a:rPr lang="en-US" dirty="0" smtClean="0"/>
+              <a:t>Start training for administration</a:t>
+            </a:r>
+          </a:p>
+          <a:p>
+            <a:pPr lvl="1"/>
+            <a:r>
+              <a:rPr lang="en-US" dirty="0" smtClean="0"/>
+              <a:t>Friday we have a training session for phone set up (Android).</a:t>
+            </a:r>
+          </a:p>
+          <a:p>
+            <a:r>
+              <a:rPr lang="en-US" dirty="0" smtClean="0"/>
+              <a:t>Deploying </a:t>
+            </a:r>
+            <a:r>
+              <a:rPr lang="en-US" dirty="0" smtClean="0"/>
+              <a:t>on </a:t>
             </a:r>
             <a:r>
               <a:rPr lang="en-US" dirty="0" err="1" smtClean="0"/>
-              <a:t>PhoneGap</a:t>
-            </a:r>
-            <a:r>
-              <a:rPr lang="en-US" dirty="0" smtClean="0"/>
-              <a:t> app</a:t>
-            </a:r>
+              <a:t>iOS</a:t>
+            </a:r>
+            <a:endParaRPr lang="en-US" dirty="0" smtClean="0"/>
           </a:p>
           <a:p>
             <a:pPr lvl="1"/>
             <a:r>
               <a:rPr lang="en-US" dirty="0" smtClean="0"/>
-              <a:t>Still need to import web content 	</a:t>
-            </a:r>
-          </a:p>
-          <a:p>
-            <a:r>
-              <a:rPr lang="en-US" dirty="0" smtClean="0"/>
-              <a:t>Physical device would be useful</a:t>
-            </a:r>
-          </a:p>
-          <a:p>
+              <a:t>Need a test account with simple campaigns</a:t>
+            </a:r>
+          </a:p>
+          <a:p>
+            <a:pPr lvl="1"/>
+            <a:r>
+              <a:rPr lang="en-US" dirty="0" smtClean="0"/>
+              <a:t>Takes about a week to get </a:t>
+            </a:r>
+            <a:r>
+              <a:rPr lang="en-US" dirty="0" smtClean="0"/>
+              <a:t>approved</a:t>
+            </a:r>
+          </a:p>
+          <a:p>
+            <a:pPr lvl="1"/>
+            <a:r>
+              <a:rPr lang="en-US" dirty="0" smtClean="0"/>
+              <a:t>Zorayr, open an issue on </a:t>
+            </a:r>
             <a:r>
               <a:rPr lang="en-US" dirty="0" err="1" smtClean="0"/>
-              <a:t>LocalNotification</a:t>
-            </a:r>
-            <a:r>
-              <a:rPr lang="en-US" dirty="0" smtClean="0"/>
-              <a:t> </a:t>
-            </a:r>
-            <a:r>
-              <a:rPr lang="en-US" dirty="0" err="1" smtClean="0"/>
-              <a:t>plugin</a:t>
+              <a:t>git</a:t>
+            </a:r>
+            <a:r>
+              <a:rPr lang="en-US" dirty="0" smtClean="0"/>
+              <a:t>. </a:t>
             </a:r>
             <a:endParaRPr lang="en-US" dirty="0" smtClean="0"/>
           </a:p>
           <a:p>
-            <a:pPr lvl="1"/>
-            <a:r>
-              <a:rPr lang="en-US" dirty="0" smtClean="0"/>
-              <a:t>Needs concurrent development </a:t>
-            </a:r>
-          </a:p>
-          <a:p>
-            <a:endParaRPr lang="en-US" dirty="0" smtClean="0"/>
-          </a:p>
-          <a:p>
+            <a:r>
+              <a:rPr lang="en-US" dirty="0" smtClean="0"/>
+              <a:t>Deploying on Android</a:t>
+            </a:r>
+          </a:p>
+          <a:p>
+            <a:pPr>
+              <a:buNone/>
+            </a:pPr>
             <a:endParaRPr lang="en-US" dirty="0"/>
           </a:p>
         </p:txBody>
@@ -6720,6 +6968,13 @@
   <p:clrMapOvr>
     <a:masterClrMapping/>
   </p:clrMapOvr>
+  <p:timing>
+    <p:tnLst>
+      <p:par>
+        <p:cTn id="1" dur="indefinite" restart="never" nodeType="tmRoot"/>
+      </p:par>
+    </p:tnLst>
+  </p:timing>
 </p:sld>
 </file>
 
@@ -6757,7 +7012,7 @@
           <a:p>
             <a:r>
               <a:rPr lang="en-US" dirty="0" smtClean="0"/>
-              <a:t>Automated Testing</a:t>
+              <a:t>Updates on WP7</a:t>
             </a:r>
             <a:endParaRPr lang="en-US" dirty="0"/>
           </a:p>
@@ -6780,56 +7035,70 @@
           <a:p>
             <a:r>
               <a:rPr lang="en-US" dirty="0" smtClean="0"/>
-              <a:t>Start writing unit tests and automated workflow tests.</a:t>
-            </a:r>
-          </a:p>
-          <a:p>
-            <a:r>
-              <a:rPr lang="en-US" dirty="0" smtClean="0"/>
-              <a:t>Selenium Testing Suite</a:t>
+              <a:t>Two major issues with WP7 IE9 engine (so far)</a:t>
             </a:r>
           </a:p>
           <a:p>
             <a:pPr lvl="1"/>
             <a:r>
               <a:rPr lang="en-US" dirty="0" smtClean="0"/>
-              <a:t>Web browser automation</a:t>
-            </a:r>
+              <a:t>No support for native </a:t>
+            </a:r>
+            <a:r>
+              <a:rPr lang="en-US" dirty="0" err="1" smtClean="0"/>
+              <a:t>window.JSON</a:t>
+            </a:r>
+            <a:endParaRPr lang="en-US" dirty="0" smtClean="0"/>
           </a:p>
           <a:p>
             <a:pPr lvl="1"/>
             <a:r>
               <a:rPr lang="en-US" dirty="0" smtClean="0"/>
-              <a:t>Both Android and </a:t>
+              <a:t>No support for native </a:t>
             </a:r>
             <a:r>
               <a:rPr lang="en-US" dirty="0" err="1" smtClean="0"/>
-              <a:t>iOS</a:t>
-            </a:r>
-            <a:r>
-              <a:rPr lang="en-US" dirty="0" smtClean="0"/>
-              <a:t> versions</a:t>
-            </a:r>
+              <a:t>window.console</a:t>
+            </a:r>
+            <a:endParaRPr lang="en-US" dirty="0" smtClean="0"/>
+          </a:p>
+          <a:p>
+            <a:r>
+              <a:rPr lang="en-US" dirty="0" smtClean="0"/>
+              <a:t>Use Douglas </a:t>
+            </a:r>
+            <a:r>
+              <a:rPr lang="en-US" dirty="0" err="1" smtClean="0"/>
+              <a:t>Crockford’s</a:t>
+            </a:r>
+            <a:r>
+              <a:rPr lang="en-US" dirty="0" smtClean="0"/>
+              <a:t> JSON </a:t>
+            </a:r>
+            <a:r>
+              <a:rPr lang="en-US" dirty="0" err="1" smtClean="0"/>
+              <a:t>plugin</a:t>
+            </a:r>
+            <a:endParaRPr lang="en-US" dirty="0" smtClean="0"/>
+          </a:p>
+          <a:p>
+            <a:r>
+              <a:rPr lang="en-US" dirty="0" err="1" smtClean="0"/>
+              <a:t>LocalNotificationPlugin</a:t>
+            </a:r>
+            <a:endParaRPr lang="en-US" dirty="0" smtClean="0"/>
           </a:p>
           <a:p>
             <a:pPr lvl="1"/>
             <a:r>
               <a:rPr lang="en-US" dirty="0" smtClean="0"/>
-              <a:t>Platform?</a:t>
-            </a:r>
-          </a:p>
-          <a:p>
-            <a:r>
-              <a:rPr lang="en-US" dirty="0" smtClean="0"/>
-              <a:t>Critical for moving forward </a:t>
-            </a:r>
-          </a:p>
-          <a:p>
-            <a:pPr lvl="1"/>
-            <a:r>
-              <a:rPr lang="en-US" dirty="0" smtClean="0"/>
-              <a:t>Will take some time ~ 3 to 4 weeks ~</a:t>
-            </a:r>
+              <a:t>Taron will be working concurrently on writing the </a:t>
+            </a:r>
+            <a:r>
+              <a:rPr lang="en-US" dirty="0" err="1" smtClean="0"/>
+              <a:t>plugin</a:t>
+            </a:r>
+            <a:endParaRPr lang="en-US" dirty="0"/>
           </a:p>
         </p:txBody>
       </p:sp>
@@ -6838,6 +7107,13 @@
   <p:clrMapOvr>
     <a:masterClrMapping/>
   </p:clrMapOvr>
+  <p:timing>
+    <p:tnLst>
+      <p:par>
+        <p:cTn id="1" dur="indefinite" restart="never" nodeType="tmRoot"/>
+      </p:par>
+    </p:tnLst>
+  </p:timing>
 </p:sld>
 </file>
 
@@ -6875,7 +7151,7 @@
           <a:p>
             <a:r>
               <a:rPr lang="en-US" dirty="0" smtClean="0"/>
-              <a:t>What to do next?</a:t>
+              <a:t>Updates on BB</a:t>
             </a:r>
             <a:endParaRPr lang="en-US" dirty="0"/>
           </a:p>
@@ -6898,35 +7174,63 @@
           <a:p>
             <a:r>
               <a:rPr lang="en-US" dirty="0" smtClean="0"/>
-              <a:t>Prioritize and schedule</a:t>
-            </a:r>
-          </a:p>
-          <a:p>
-            <a:r>
-              <a:rPr lang="en-US" dirty="0" smtClean="0"/>
-              <a:t>Work on device-specific bugs</a:t>
-            </a:r>
-          </a:p>
-          <a:p>
-            <a:r>
-              <a:rPr lang="en-US" dirty="0" smtClean="0"/>
-              <a:t>Refractor and optimize </a:t>
-            </a:r>
-          </a:p>
-          <a:p>
-            <a:r>
-              <a:rPr lang="en-US" dirty="0" smtClean="0"/>
-              <a:t>Test</a:t>
-            </a:r>
-          </a:p>
-          <a:p>
-            <a:r>
-              <a:rPr lang="en-US" dirty="0" smtClean="0"/>
-              <a:t>Progress tracking &amp; bi-weekly meetings</a:t>
-            </a:r>
-          </a:p>
-          <a:p>
+              <a:t>What version to work on? </a:t>
+            </a:r>
+          </a:p>
+          <a:p>
+            <a:r>
+              <a:rPr lang="en-US" dirty="0" smtClean="0"/>
+              <a:t>Have a working </a:t>
+            </a:r>
+            <a:r>
+              <a:rPr lang="en-US" dirty="0" err="1" smtClean="0"/>
+              <a:t>PhoneGap</a:t>
+            </a:r>
+            <a:r>
+              <a:rPr lang="en-US" dirty="0" smtClean="0"/>
+              <a:t> app</a:t>
+            </a:r>
+          </a:p>
+          <a:p>
+            <a:pPr lvl="1"/>
+            <a:r>
+              <a:rPr lang="en-US" dirty="0" smtClean="0"/>
+              <a:t>Still need to import web content 	</a:t>
+            </a:r>
+          </a:p>
+          <a:p>
+            <a:r>
+              <a:rPr lang="en-US" dirty="0" smtClean="0"/>
+              <a:t>Physical device would be useful</a:t>
+            </a:r>
+          </a:p>
+          <a:p>
+            <a:r>
+              <a:rPr lang="en-US" dirty="0" err="1" smtClean="0"/>
+              <a:t>LocalNotification</a:t>
+            </a:r>
+            <a:r>
+              <a:rPr lang="en-US" dirty="0" smtClean="0"/>
+              <a:t> </a:t>
+            </a:r>
+            <a:r>
+              <a:rPr lang="en-US" dirty="0" err="1" smtClean="0"/>
+              <a:t>plugin</a:t>
+            </a:r>
             <a:endParaRPr lang="en-US" dirty="0" smtClean="0"/>
+          </a:p>
+          <a:p>
+            <a:pPr lvl="1"/>
+            <a:r>
+              <a:rPr lang="en-US" dirty="0" smtClean="0"/>
+              <a:t>Needs concurrent development </a:t>
+            </a:r>
+          </a:p>
+          <a:p>
+            <a:endParaRPr lang="en-US" dirty="0" smtClean="0"/>
+          </a:p>
+          <a:p>
+            <a:endParaRPr lang="en-US" dirty="0"/>
           </a:p>
         </p:txBody>
       </p:sp>
@@ -6935,6 +7239,138 @@
   <p:clrMapOvr>
     <a:masterClrMapping/>
   </p:clrMapOvr>
+  <p:timing>
+    <p:tnLst>
+      <p:par>
+        <p:cTn id="1" dur="indefinite" restart="never" nodeType="tmRoot"/>
+      </p:par>
+    </p:tnLst>
+  </p:timing>
+</p:sld>
+</file>
+
+<file path=ppt/slides/slide9.xml><?xml version="1.0" encoding="utf-8"?>
+<p:sld xmlns:a="http://schemas.openxmlformats.org/drawingml/2006/main" xmlns:r="http://schemas.openxmlformats.org/officeDocument/2006/relationships" xmlns:p="http://schemas.openxmlformats.org/presentationml/2006/main">
+  <p:cSld>
+    <p:spTree>
+      <p:nvGrpSpPr>
+        <p:cNvPr id="1" name=""/>
+        <p:cNvGrpSpPr/>
+        <p:nvPr/>
+      </p:nvGrpSpPr>
+      <p:grpSpPr>
+        <a:xfrm>
+          <a:off x="0" y="0"/>
+          <a:ext cx="0" cy="0"/>
+          <a:chOff x="0" y="0"/>
+          <a:chExt cx="0" cy="0"/>
+        </a:xfrm>
+      </p:grpSpPr>
+      <p:sp>
+        <p:nvSpPr>
+          <p:cNvPr id="2" name="Title 1"/>
+          <p:cNvSpPr>
+            <a:spLocks noGrp="1"/>
+          </p:cNvSpPr>
+          <p:nvPr>
+            <p:ph type="title"/>
+          </p:nvPr>
+        </p:nvSpPr>
+        <p:spPr/>
+        <p:txBody>
+          <a:bodyPr/>
+          <a:lstStyle/>
+          <a:p>
+            <a:r>
+              <a:rPr lang="en-US" dirty="0" smtClean="0"/>
+              <a:t>Automated Testing</a:t>
+            </a:r>
+            <a:endParaRPr lang="en-US" dirty="0"/>
+          </a:p>
+        </p:txBody>
+      </p:sp>
+      <p:sp>
+        <p:nvSpPr>
+          <p:cNvPr id="3" name="Content Placeholder 2"/>
+          <p:cNvSpPr>
+            <a:spLocks noGrp="1"/>
+          </p:cNvSpPr>
+          <p:nvPr>
+            <p:ph sz="quarter" idx="1"/>
+          </p:nvPr>
+        </p:nvSpPr>
+        <p:spPr/>
+        <p:txBody>
+          <a:bodyPr/>
+          <a:lstStyle/>
+          <a:p>
+            <a:r>
+              <a:rPr lang="en-US" dirty="0" smtClean="0"/>
+              <a:t>Start writing unit tests and automated workflow tests.</a:t>
+            </a:r>
+          </a:p>
+          <a:p>
+            <a:r>
+              <a:rPr lang="en-US" dirty="0" smtClean="0"/>
+              <a:t>Selenium Testing Suite</a:t>
+            </a:r>
+          </a:p>
+          <a:p>
+            <a:pPr lvl="1"/>
+            <a:r>
+              <a:rPr lang="en-US" dirty="0" smtClean="0"/>
+              <a:t>Web browser automation</a:t>
+            </a:r>
+          </a:p>
+          <a:p>
+            <a:pPr lvl="1"/>
+            <a:r>
+              <a:rPr lang="en-US" dirty="0" smtClean="0"/>
+              <a:t>Both Android and </a:t>
+            </a:r>
+            <a:r>
+              <a:rPr lang="en-US" dirty="0" err="1" smtClean="0"/>
+              <a:t>iOS</a:t>
+            </a:r>
+            <a:r>
+              <a:rPr lang="en-US" dirty="0" smtClean="0"/>
+              <a:t> versions</a:t>
+            </a:r>
+          </a:p>
+          <a:p>
+            <a:pPr lvl="1"/>
+            <a:r>
+              <a:rPr lang="en-US" dirty="0" smtClean="0"/>
+              <a:t>Platform?</a:t>
+            </a:r>
+          </a:p>
+          <a:p>
+            <a:r>
+              <a:rPr lang="en-US" dirty="0" smtClean="0"/>
+              <a:t>Critical for moving forward </a:t>
+            </a:r>
+          </a:p>
+          <a:p>
+            <a:pPr lvl="1"/>
+            <a:r>
+              <a:rPr lang="en-US" dirty="0" smtClean="0"/>
+              <a:t>Will take some time ~ 3 to 4 weeks ~</a:t>
+            </a:r>
+          </a:p>
+        </p:txBody>
+      </p:sp>
+    </p:spTree>
+  </p:cSld>
+  <p:clrMapOvr>
+    <a:masterClrMapping/>
+  </p:clrMapOvr>
+  <p:timing>
+    <p:tnLst>
+      <p:par>
+        <p:cTn id="1" dur="indefinite" restart="never" nodeType="tmRoot"/>
+      </p:par>
+    </p:tnLst>
+  </p:timing>
 </p:sld>
 </file>
 

</xml_diff>